<commit_message>
Added Tutorial Url to Presentation
</commit_message>
<xml_diff>
--- a/Unity.pptx
+++ b/Unity.pptx
@@ -206,7 +206,7 @@
           <a:p>
             <a:fld id="{82018535-F3B1-47A0-B5EA-F97D672B862C}" type="datetimeFigureOut">
               <a:rPr lang="de-DE" smtClean="0"/>
-              <a:t>20.05.2016</a:t>
+              <a:t>30.05.2016</a:t>
             </a:fld>
             <a:endParaRPr lang="de-DE"/>
           </a:p>
@@ -663,7 +663,7 @@
               <a:buChar char="-"/>
             </a:pPr>
             <a:r>
-              <a:rPr lang="de-DE" dirty="0" smtClean="0"/>
+              <a:rPr lang="de-DE" sz="3200" dirty="0" smtClean="0"/>
               <a:t>Unterstützt 24 Große Plattformen, welche sich in mobile, VR, Computer, Konsole und TV Plattformen aufteilen</a:t>
             </a:r>
           </a:p>
@@ -686,14 +686,14 @@
               <a:defRPr/>
             </a:pPr>
             <a:r>
-              <a:rPr lang="de-DE" dirty="0" smtClean="0"/>
-              <a:t>z.B. ein entwickelt man ein Mobile Game. Und mit einem Click läuft es auf IOS, Android, Windows Phone und </a:t>
-            </a:r>
-            <a:r>
-              <a:rPr lang="de-DE" dirty="0" err="1" smtClean="0"/>
+              <a:rPr lang="de-DE" sz="3200" dirty="0" smtClean="0"/>
+              <a:t>z.B. entwickelt man ein Mobile Game. Und mit einem Click läuft es auf IOS, Android, Windows Phone und </a:t>
+            </a:r>
+            <a:r>
+              <a:rPr lang="de-DE" sz="3200" dirty="0" err="1" smtClean="0"/>
               <a:t>Tizen</a:t>
             </a:r>
-            <a:endParaRPr lang="de-DE" dirty="0" smtClean="0"/>
+            <a:endParaRPr lang="de-DE" sz="3200" dirty="0" smtClean="0"/>
           </a:p>
           <a:p>
             <a:pPr marL="628650" marR="0" lvl="1" indent="-171450" algn="l" defTabSz="914400" rtl="0" eaLnBrk="1" fontAlgn="auto" latinLnBrk="0" hangingPunct="1">
@@ -714,15 +714,15 @@
               <a:defRPr/>
             </a:pPr>
             <a:r>
-              <a:rPr lang="de-DE" dirty="0" smtClean="0"/>
+              <a:rPr lang="de-DE" sz="3200" dirty="0" smtClean="0"/>
               <a:t>Das ist ein Grund warum Unity der Weltmarktführer in Q1 2016 für die Masse an installierten mobile Games war. Android 81 % und </a:t>
             </a:r>
             <a:r>
-              <a:rPr lang="de-DE" dirty="0" err="1" smtClean="0"/>
+              <a:rPr lang="de-DE" sz="3200" dirty="0" err="1" smtClean="0"/>
               <a:t>iOS</a:t>
             </a:r>
             <a:r>
-              <a:rPr lang="de-DE" dirty="0" smtClean="0"/>
+              <a:rPr lang="de-DE" sz="3200" dirty="0" smtClean="0"/>
               <a:t> 17%.</a:t>
             </a:r>
           </a:p>
@@ -731,7 +731,7 @@
               <a:buFontTx/>
               <a:buNone/>
             </a:pPr>
-            <a:endParaRPr lang="de-DE" dirty="0" smtClean="0"/>
+            <a:endParaRPr lang="de-DE" sz="3200" dirty="0" smtClean="0"/>
           </a:p>
           <a:p>
             <a:pPr marL="171450" indent="-171450">
@@ -739,7 +739,7 @@
               <a:buChar char="-"/>
             </a:pPr>
             <a:r>
-              <a:rPr lang="de-DE" dirty="0" smtClean="0"/>
+              <a:rPr lang="de-DE" sz="3200" dirty="0" smtClean="0"/>
               <a:t>Bietet einen Schnellen und einfachen Zugriff auf wichtige Informationen, die helfen dein Spiel zu verbessern. Im wirtschaftlichen und Spiele technischen Sinne</a:t>
             </a:r>
           </a:p>
@@ -762,31 +762,23 @@
               <a:defRPr/>
             </a:pPr>
             <a:r>
-              <a:rPr lang="de-DE" dirty="0" smtClean="0"/>
-              <a:t>Bietet ein Framework, welches sich mit real-time </a:t>
-            </a:r>
-            <a:r>
-              <a:rPr lang="de-DE" dirty="0" err="1" smtClean="0"/>
-              <a:t>netzwerk</a:t>
-            </a:r>
-            <a:r>
-              <a:rPr lang="de-DE" dirty="0" smtClean="0"/>
-              <a:t> Anwendungen befasst, </a:t>
-            </a:r>
-            <a:r>
-              <a:rPr lang="de-DE" dirty="0" err="1" smtClean="0"/>
-              <a:t>unterstüzt</a:t>
-            </a:r>
-            <a:r>
-              <a:rPr lang="de-DE" dirty="0" smtClean="0"/>
-              <a:t> den Entwickler beispielsweise auch durch </a:t>
-            </a:r>
-            <a:r>
-              <a:rPr lang="de-DE" dirty="0" err="1" smtClean="0"/>
+              <a:rPr lang="de-DE" sz="3200" dirty="0" smtClean="0"/>
+              <a:t>Bietet ein Framework, welches sich mit real-time Netzwerk Anwendungen befasst</a:t>
+            </a:r>
+            <a:r>
+              <a:rPr lang="de-DE" sz="3200" smtClean="0"/>
+              <a:t>, unterstützt </a:t>
+            </a:r>
+            <a:r>
+              <a:rPr lang="de-DE" sz="3200" dirty="0" smtClean="0"/>
+              <a:t>den Entwickler beispielsweise auch durch </a:t>
+            </a:r>
+            <a:r>
+              <a:rPr lang="de-DE" sz="3200" dirty="0" err="1" smtClean="0"/>
               <a:t>Matchmaker</a:t>
             </a:r>
             <a:r>
-              <a:rPr lang="de-DE" dirty="0" smtClean="0"/>
+              <a:rPr lang="de-DE" sz="3200" dirty="0" smtClean="0"/>
               <a:t> Servers, um eine gleichbleibende Qualität der Sessions zu sichern</a:t>
             </a:r>
           </a:p>
@@ -795,14 +787,14 @@
               <a:buFontTx/>
               <a:buChar char="-"/>
             </a:pPr>
-            <a:endParaRPr lang="de-DE" dirty="0" smtClean="0"/>
+            <a:endParaRPr lang="de-DE" sz="3200" dirty="0" smtClean="0"/>
           </a:p>
           <a:p>
             <a:pPr marL="171450" indent="-171450">
               <a:buFontTx/>
               <a:buChar char="-"/>
             </a:pPr>
-            <a:endParaRPr lang="de-DE" dirty="0" smtClean="0"/>
+            <a:endParaRPr lang="de-DE" sz="1800" dirty="0" smtClean="0"/>
           </a:p>
           <a:p>
             <a:pPr marL="457200" marR="0" lvl="1" indent="0" algn="l" defTabSz="914400" rtl="0" eaLnBrk="1" fontAlgn="auto" latinLnBrk="0" hangingPunct="1">
@@ -5144,7 +5136,7 @@
           <a:p>
             <a:fld id="{48A87A34-81AB-432B-8DAE-1953F412C126}" type="datetimeFigureOut">
               <a:rPr lang="en-US" smtClean="0"/>
-              <a:t>5/20/2016</a:t>
+              <a:t>5/30/2016</a:t>
             </a:fld>
             <a:endParaRPr lang="en-US" dirty="0"/>
           </a:p>
@@ -5411,7 +5403,7 @@
           <a:p>
             <a:fld id="{48A87A34-81AB-432B-8DAE-1953F412C126}" type="datetimeFigureOut">
               <a:rPr lang="en-US" smtClean="0"/>
-              <a:t>5/20/2016</a:t>
+              <a:t>5/30/2016</a:t>
             </a:fld>
             <a:endParaRPr lang="en-US" dirty="0"/>
           </a:p>
@@ -5607,7 +5599,7 @@
           <a:p>
             <a:fld id="{48A87A34-81AB-432B-8DAE-1953F412C126}" type="datetimeFigureOut">
               <a:rPr lang="en-US" smtClean="0"/>
-              <a:t>5/20/2016</a:t>
+              <a:t>5/30/2016</a:t>
             </a:fld>
             <a:endParaRPr lang="en-US" dirty="0"/>
           </a:p>
@@ -5870,7 +5862,7 @@
           <a:p>
             <a:fld id="{48A87A34-81AB-432B-8DAE-1953F412C126}" type="datetimeFigureOut">
               <a:rPr lang="en-US" smtClean="0"/>
-              <a:t>5/20/2016</a:t>
+              <a:t>5/30/2016</a:t>
             </a:fld>
             <a:endParaRPr lang="en-US" dirty="0"/>
           </a:p>
@@ -6304,7 +6296,7 @@
           <a:p>
             <a:fld id="{48A87A34-81AB-432B-8DAE-1953F412C126}" type="datetimeFigureOut">
               <a:rPr lang="en-US" smtClean="0"/>
-              <a:t>5/20/2016</a:t>
+              <a:t>5/30/2016</a:t>
             </a:fld>
             <a:endParaRPr lang="en-US" dirty="0"/>
           </a:p>
@@ -6850,7 +6842,7 @@
           <a:p>
             <a:fld id="{48A87A34-81AB-432B-8DAE-1953F412C126}" type="datetimeFigureOut">
               <a:rPr lang="en-US" smtClean="0"/>
-              <a:t>5/20/2016</a:t>
+              <a:t>5/30/2016</a:t>
             </a:fld>
             <a:endParaRPr lang="en-US" dirty="0"/>
           </a:p>
@@ -7570,7 +7562,7 @@
           <a:p>
             <a:fld id="{48A87A34-81AB-432B-8DAE-1953F412C126}" type="datetimeFigureOut">
               <a:rPr lang="en-US" smtClean="0"/>
-              <a:t>5/20/2016</a:t>
+              <a:t>5/30/2016</a:t>
             </a:fld>
             <a:endParaRPr lang="en-US" dirty="0"/>
           </a:p>
@@ -7740,7 +7732,7 @@
           <a:p>
             <a:fld id="{48A87A34-81AB-432B-8DAE-1953F412C126}" type="datetimeFigureOut">
               <a:rPr lang="en-US" smtClean="0"/>
-              <a:t>5/20/2016</a:t>
+              <a:t>5/30/2016</a:t>
             </a:fld>
             <a:endParaRPr lang="en-US" dirty="0"/>
           </a:p>
@@ -7920,7 +7912,7 @@
           <a:p>
             <a:fld id="{48A87A34-81AB-432B-8DAE-1953F412C126}" type="datetimeFigureOut">
               <a:rPr lang="en-US" smtClean="0"/>
-              <a:t>5/20/2016</a:t>
+              <a:t>5/30/2016</a:t>
             </a:fld>
             <a:endParaRPr lang="en-US" dirty="0"/>
           </a:p>
@@ -8090,7 +8082,7 @@
           <a:p>
             <a:fld id="{48A87A34-81AB-432B-8DAE-1953F412C126}" type="datetimeFigureOut">
               <a:rPr lang="en-US" smtClean="0"/>
-              <a:t>5/20/2016</a:t>
+              <a:t>5/30/2016</a:t>
             </a:fld>
             <a:endParaRPr lang="en-US" dirty="0"/>
           </a:p>
@@ -8340,7 +8332,7 @@
           <a:p>
             <a:fld id="{48A87A34-81AB-432B-8DAE-1953F412C126}" type="datetimeFigureOut">
               <a:rPr lang="en-US" smtClean="0"/>
-              <a:t>5/20/2016</a:t>
+              <a:t>5/30/2016</a:t>
             </a:fld>
             <a:endParaRPr lang="en-US" dirty="0"/>
           </a:p>
@@ -8572,7 +8564,7 @@
           <a:p>
             <a:fld id="{48A87A34-81AB-432B-8DAE-1953F412C126}" type="datetimeFigureOut">
               <a:rPr lang="en-US" smtClean="0"/>
-              <a:t>5/20/2016</a:t>
+              <a:t>5/30/2016</a:t>
             </a:fld>
             <a:endParaRPr lang="en-US" dirty="0"/>
           </a:p>
@@ -8953,7 +8945,7 @@
           <a:p>
             <a:fld id="{48A87A34-81AB-432B-8DAE-1953F412C126}" type="datetimeFigureOut">
               <a:rPr lang="en-US" smtClean="0"/>
-              <a:t>5/20/2016</a:t>
+              <a:t>5/30/2016</a:t>
             </a:fld>
             <a:endParaRPr lang="en-US" dirty="0"/>
           </a:p>
@@ -9071,7 +9063,7 @@
           <a:p>
             <a:fld id="{48A87A34-81AB-432B-8DAE-1953F412C126}" type="datetimeFigureOut">
               <a:rPr lang="en-US" smtClean="0"/>
-              <a:t>5/20/2016</a:t>
+              <a:t>5/30/2016</a:t>
             </a:fld>
             <a:endParaRPr lang="en-US" dirty="0"/>
           </a:p>
@@ -9166,7 +9158,7 @@
           <a:p>
             <a:fld id="{48A87A34-81AB-432B-8DAE-1953F412C126}" type="datetimeFigureOut">
               <a:rPr lang="en-US" smtClean="0"/>
-              <a:t>5/20/2016</a:t>
+              <a:t>5/30/2016</a:t>
             </a:fld>
             <a:endParaRPr lang="en-US" dirty="0"/>
           </a:p>
@@ -9415,7 +9407,7 @@
           <a:p>
             <a:fld id="{48A87A34-81AB-432B-8DAE-1953F412C126}" type="datetimeFigureOut">
               <a:rPr lang="en-US" smtClean="0"/>
-              <a:t>5/20/2016</a:t>
+              <a:t>5/30/2016</a:t>
             </a:fld>
             <a:endParaRPr lang="en-US" dirty="0"/>
           </a:p>
@@ -9695,7 +9687,7 @@
           <a:p>
             <a:fld id="{48A87A34-81AB-432B-8DAE-1953F412C126}" type="datetimeFigureOut">
               <a:rPr lang="en-US" smtClean="0"/>
-              <a:t>5/20/2016</a:t>
+              <a:t>5/30/2016</a:t>
             </a:fld>
             <a:endParaRPr lang="en-US" dirty="0"/>
           </a:p>
@@ -12763,7 +12755,7 @@
             <a:fld id="{48A87A34-81AB-432B-8DAE-1953F412C126}" type="datetimeFigureOut">
               <a:rPr lang="en-US" smtClean="0"/>
               <a:pPr/>
-              <a:t>5/20/2016</a:t>
+              <a:t>5/30/2016</a:t>
             </a:fld>
             <a:endParaRPr lang="en-US" dirty="0"/>
           </a:p>
@@ -13313,8 +13305,8 @@
           <a:lstStyle/>
           <a:p>
             <a:r>
-              <a:rPr lang="de-DE" dirty="0" err="1" smtClean="0"/>
-              <a:t>GliederUNG</a:t>
+              <a:rPr lang="de-DE" dirty="0" smtClean="0"/>
+              <a:t>Gliederung</a:t>
             </a:r>
             <a:endParaRPr lang="de-DE" dirty="0"/>
           </a:p>
@@ -13594,15 +13586,15 @@
           <a:p>
             <a:r>
               <a:rPr lang="de-DE" dirty="0" smtClean="0"/>
-              <a:t>Eine Vielzahl von Frameworks z.B. Unity Analytics oder </a:t>
-            </a:r>
-            <a:r>
-              <a:rPr lang="de-DE" dirty="0" err="1" smtClean="0"/>
-              <a:t>Uinity</a:t>
+              <a:t>Eine Vielzahl von Frameworks z.B. Unity Analytics </a:t>
+            </a:r>
+            <a:r>
+              <a:rPr lang="de-DE" smtClean="0"/>
+              <a:t>oder Unity </a:t>
             </a:r>
             <a:r>
               <a:rPr lang="de-DE" dirty="0" smtClean="0"/>
-              <a:t> Multiplayer</a:t>
+              <a:t>Multiplayer</a:t>
             </a:r>
           </a:p>
           <a:p>
@@ -13862,9 +13854,15 @@
               <a:rPr lang="de-DE" dirty="0" smtClean="0"/>
               <a:t>github.com/Digister/ePortfolio/Testproject</a:t>
             </a:r>
+          </a:p>
+          <a:p>
             <a:endParaRPr lang="de-DE" dirty="0" smtClean="0"/>
           </a:p>
           <a:p>
+            <a:r>
+              <a:rPr lang="de-DE"/>
+              <a:t>Tutorial: https://unity3d.com/learn/tutorials/projects/roll-ball-tutorial</a:t>
+            </a:r>
             <a:endParaRPr lang="de-DE" dirty="0"/>
           </a:p>
         </p:txBody>

</xml_diff>